<commit_message>
add readme and update docker files
</commit_message>
<xml_diff>
--- a/diagram.pptx
+++ b/diagram.pptx
@@ -5,7 +5,8 @@
     <p:sldMasterId id="2147483648" r:id="rId1"/>
   </p:sldMasterIdLst>
   <p:sldIdLst>
-    <p:sldId id="256" r:id="rId2"/>
+    <p:sldId id="257" r:id="rId2"/>
+    <p:sldId id="258" r:id="rId3"/>
   </p:sldIdLst>
   <p:sldSz cx="12192000" cy="6858000"/>
   <p:notesSz cx="6858000" cy="9144000"/>
@@ -104,6 +105,11 @@
       </a:defRPr>
     </a:lvl9pPr>
   </p:defaultTextStyle>
+  <p:extLst>
+    <p:ext uri="{EFAFB233-063F-42B5-8137-9DF3F51BA10A}">
+      <p15:sldGuideLst xmlns:p15="http://schemas.microsoft.com/office/powerpoint/2012/main"/>
+    </p:ext>
+  </p:extLst>
 </p:presentation>
 </file>
 
@@ -254,7 +260,7 @@
           <a:p>
             <a:fld id="{8A917354-6903-4EC6-B90E-505176212F8F}" type="datetimeFigureOut">
               <a:rPr lang="en-US" smtClean="0"/>
-              <a:t>4/16/2021</a:t>
+              <a:t>4/21/2021</a:t>
             </a:fld>
             <a:endParaRPr lang="en-US"/>
           </a:p>
@@ -452,7 +458,7 @@
           <a:p>
             <a:fld id="{8A917354-6903-4EC6-B90E-505176212F8F}" type="datetimeFigureOut">
               <a:rPr lang="en-US" smtClean="0"/>
-              <a:t>4/16/2021</a:t>
+              <a:t>4/21/2021</a:t>
             </a:fld>
             <a:endParaRPr lang="en-US"/>
           </a:p>
@@ -660,7 +666,7 @@
           <a:p>
             <a:fld id="{8A917354-6903-4EC6-B90E-505176212F8F}" type="datetimeFigureOut">
               <a:rPr lang="en-US" smtClean="0"/>
-              <a:t>4/16/2021</a:t>
+              <a:t>4/21/2021</a:t>
             </a:fld>
             <a:endParaRPr lang="en-US"/>
           </a:p>
@@ -858,7 +864,7 @@
           <a:p>
             <a:fld id="{8A917354-6903-4EC6-B90E-505176212F8F}" type="datetimeFigureOut">
               <a:rPr lang="en-US" smtClean="0"/>
-              <a:t>4/16/2021</a:t>
+              <a:t>4/21/2021</a:t>
             </a:fld>
             <a:endParaRPr lang="en-US"/>
           </a:p>
@@ -1133,7 +1139,7 @@
           <a:p>
             <a:fld id="{8A917354-6903-4EC6-B90E-505176212F8F}" type="datetimeFigureOut">
               <a:rPr lang="en-US" smtClean="0"/>
-              <a:t>4/16/2021</a:t>
+              <a:t>4/21/2021</a:t>
             </a:fld>
             <a:endParaRPr lang="en-US"/>
           </a:p>
@@ -1398,7 +1404,7 @@
           <a:p>
             <a:fld id="{8A917354-6903-4EC6-B90E-505176212F8F}" type="datetimeFigureOut">
               <a:rPr lang="en-US" smtClean="0"/>
-              <a:t>4/16/2021</a:t>
+              <a:t>4/21/2021</a:t>
             </a:fld>
             <a:endParaRPr lang="en-US"/>
           </a:p>
@@ -1810,7 +1816,7 @@
           <a:p>
             <a:fld id="{8A917354-6903-4EC6-B90E-505176212F8F}" type="datetimeFigureOut">
               <a:rPr lang="en-US" smtClean="0"/>
-              <a:t>4/16/2021</a:t>
+              <a:t>4/21/2021</a:t>
             </a:fld>
             <a:endParaRPr lang="en-US"/>
           </a:p>
@@ -1951,7 +1957,7 @@
           <a:p>
             <a:fld id="{8A917354-6903-4EC6-B90E-505176212F8F}" type="datetimeFigureOut">
               <a:rPr lang="en-US" smtClean="0"/>
-              <a:t>4/16/2021</a:t>
+              <a:t>4/21/2021</a:t>
             </a:fld>
             <a:endParaRPr lang="en-US"/>
           </a:p>
@@ -2064,7 +2070,7 @@
           <a:p>
             <a:fld id="{8A917354-6903-4EC6-B90E-505176212F8F}" type="datetimeFigureOut">
               <a:rPr lang="en-US" smtClean="0"/>
-              <a:t>4/16/2021</a:t>
+              <a:t>4/21/2021</a:t>
             </a:fld>
             <a:endParaRPr lang="en-US"/>
           </a:p>
@@ -2375,7 +2381,7 @@
           <a:p>
             <a:fld id="{8A917354-6903-4EC6-B90E-505176212F8F}" type="datetimeFigureOut">
               <a:rPr lang="en-US" smtClean="0"/>
-              <a:t>4/16/2021</a:t>
+              <a:t>4/21/2021</a:t>
             </a:fld>
             <a:endParaRPr lang="en-US"/>
           </a:p>
@@ -2663,7 +2669,7 @@
           <a:p>
             <a:fld id="{8A917354-6903-4EC6-B90E-505176212F8F}" type="datetimeFigureOut">
               <a:rPr lang="en-US" smtClean="0"/>
-              <a:t>4/16/2021</a:t>
+              <a:t>4/21/2021</a:t>
             </a:fld>
             <a:endParaRPr lang="en-US"/>
           </a:p>
@@ -2904,7 +2910,7 @@
           <a:p>
             <a:fld id="{8A917354-6903-4EC6-B90E-505176212F8F}" type="datetimeFigureOut">
               <a:rPr lang="en-US" smtClean="0"/>
-              <a:t>4/16/2021</a:t>
+              <a:t>4/21/2021</a:t>
             </a:fld>
             <a:endParaRPr lang="en-US"/>
           </a:p>
@@ -3321,336 +3327,12 @@
           <a:chExt cx="0" cy="0"/>
         </a:xfrm>
       </p:grpSpPr>
-      <p:grpSp>
-        <p:nvGrpSpPr>
-          <p:cNvPr id="20" name="Group 19">
-            <a:extLst>
-              <a:ext uri="{FF2B5EF4-FFF2-40B4-BE49-F238E27FC236}">
-                <a16:creationId xmlns:a16="http://schemas.microsoft.com/office/drawing/2014/main" id="{FDE7872A-FA67-4A4A-B104-67C57C9DE519}"/>
-              </a:ext>
-            </a:extLst>
-          </p:cNvPr>
-          <p:cNvGrpSpPr/>
-          <p:nvPr/>
-        </p:nvGrpSpPr>
-        <p:grpSpPr>
-          <a:xfrm>
-            <a:off x="4123946" y="719459"/>
-            <a:ext cx="2279902" cy="1036320"/>
-            <a:chOff x="6096000" y="3737111"/>
-            <a:chExt cx="2279902" cy="1036320"/>
-          </a:xfrm>
-        </p:grpSpPr>
-        <p:sp>
-          <p:nvSpPr>
-            <p:cNvPr id="21" name="Rectangle 20">
-              <a:extLst>
-                <a:ext uri="{FF2B5EF4-FFF2-40B4-BE49-F238E27FC236}">
-                  <a16:creationId xmlns:a16="http://schemas.microsoft.com/office/drawing/2014/main" id="{0D53007F-28FF-4399-AF9B-39DBD6288532}"/>
-                </a:ext>
-              </a:extLst>
-            </p:cNvPr>
-            <p:cNvSpPr/>
-            <p:nvPr/>
-          </p:nvSpPr>
-          <p:spPr>
-            <a:xfrm>
-              <a:off x="6096000" y="3737111"/>
-              <a:ext cx="2173219" cy="1021080"/>
-            </a:xfrm>
-            <a:prstGeom prst="rect">
-              <a:avLst/>
-            </a:prstGeom>
-            <a:solidFill>
-              <a:schemeClr val="accent3">
-                <a:lumMod val="60000"/>
-                <a:lumOff val="40000"/>
-              </a:schemeClr>
-            </a:solidFill>
-          </p:spPr>
-          <p:style>
-            <a:lnRef idx="2">
-              <a:schemeClr val="accent1">
-                <a:shade val="50000"/>
-              </a:schemeClr>
-            </a:lnRef>
-            <a:fillRef idx="1">
-              <a:schemeClr val="accent1"/>
-            </a:fillRef>
-            <a:effectRef idx="0">
-              <a:schemeClr val="accent1"/>
-            </a:effectRef>
-            <a:fontRef idx="minor">
-              <a:schemeClr val="lt1"/>
-            </a:fontRef>
-          </p:style>
-          <p:txBody>
-            <a:bodyPr rtlCol="0" anchor="ctr"/>
-            <a:lstStyle/>
-            <a:p>
-              <a:pPr algn="ctr"/>
-              <a:endParaRPr lang="en-US" dirty="0"/>
-            </a:p>
-          </p:txBody>
-        </p:sp>
-        <p:sp>
-          <p:nvSpPr>
-            <p:cNvPr id="22" name="TextBox 21">
-              <a:extLst>
-                <a:ext uri="{FF2B5EF4-FFF2-40B4-BE49-F238E27FC236}">
-                  <a16:creationId xmlns:a16="http://schemas.microsoft.com/office/drawing/2014/main" id="{267D24AF-6D37-48DE-95D0-2FE6AFF79726}"/>
-                </a:ext>
-              </a:extLst>
-            </p:cNvPr>
-            <p:cNvSpPr txBox="1"/>
-            <p:nvPr/>
-          </p:nvSpPr>
-          <p:spPr>
-            <a:xfrm>
-              <a:off x="7059166" y="4404099"/>
-              <a:ext cx="1316736" cy="369332"/>
-            </a:xfrm>
-            <a:prstGeom prst="rect">
-              <a:avLst/>
-            </a:prstGeom>
-            <a:noFill/>
-          </p:spPr>
-          <p:txBody>
-            <a:bodyPr wrap="square" rtlCol="0">
-              <a:spAutoFit/>
-            </a:bodyPr>
-            <a:lstStyle/>
-            <a:p>
-              <a:r>
-                <a:rPr lang="en-US" dirty="0"/>
-                <a:t>Container 3</a:t>
-              </a:r>
-            </a:p>
-          </p:txBody>
-        </p:sp>
-      </p:grpSp>
-      <p:grpSp>
-        <p:nvGrpSpPr>
-          <p:cNvPr id="17" name="Group 16">
-            <a:extLst>
-              <a:ext uri="{FF2B5EF4-FFF2-40B4-BE49-F238E27FC236}">
-                <a16:creationId xmlns:a16="http://schemas.microsoft.com/office/drawing/2014/main" id="{4AEB7703-03CF-4393-A8E9-71C3610E49F2}"/>
-              </a:ext>
-            </a:extLst>
-          </p:cNvPr>
-          <p:cNvGrpSpPr/>
-          <p:nvPr/>
-        </p:nvGrpSpPr>
-        <p:grpSpPr>
-          <a:xfrm>
-            <a:off x="4123946" y="2465832"/>
-            <a:ext cx="2279902" cy="1036320"/>
-            <a:chOff x="6096000" y="3737111"/>
-            <a:chExt cx="2279902" cy="1036320"/>
-          </a:xfrm>
-        </p:grpSpPr>
-        <p:sp>
-          <p:nvSpPr>
-            <p:cNvPr id="18" name="Rectangle 17">
-              <a:extLst>
-                <a:ext uri="{FF2B5EF4-FFF2-40B4-BE49-F238E27FC236}">
-                  <a16:creationId xmlns:a16="http://schemas.microsoft.com/office/drawing/2014/main" id="{3243FCE9-6246-4763-AD93-87C1645A301D}"/>
-                </a:ext>
-              </a:extLst>
-            </p:cNvPr>
-            <p:cNvSpPr/>
-            <p:nvPr/>
-          </p:nvSpPr>
-          <p:spPr>
-            <a:xfrm>
-              <a:off x="6096000" y="3737111"/>
-              <a:ext cx="2173219" cy="1021080"/>
-            </a:xfrm>
-            <a:prstGeom prst="rect">
-              <a:avLst/>
-            </a:prstGeom>
-            <a:solidFill>
-              <a:schemeClr val="accent3">
-                <a:lumMod val="60000"/>
-                <a:lumOff val="40000"/>
-              </a:schemeClr>
-            </a:solidFill>
-          </p:spPr>
-          <p:style>
-            <a:lnRef idx="2">
-              <a:schemeClr val="accent1">
-                <a:shade val="50000"/>
-              </a:schemeClr>
-            </a:lnRef>
-            <a:fillRef idx="1">
-              <a:schemeClr val="accent1"/>
-            </a:fillRef>
-            <a:effectRef idx="0">
-              <a:schemeClr val="accent1"/>
-            </a:effectRef>
-            <a:fontRef idx="minor">
-              <a:schemeClr val="lt1"/>
-            </a:fontRef>
-          </p:style>
-          <p:txBody>
-            <a:bodyPr rtlCol="0" anchor="ctr"/>
-            <a:lstStyle/>
-            <a:p>
-              <a:pPr algn="ctr"/>
-              <a:endParaRPr lang="en-US" dirty="0"/>
-            </a:p>
-          </p:txBody>
-        </p:sp>
-        <p:sp>
-          <p:nvSpPr>
-            <p:cNvPr id="19" name="TextBox 18">
-              <a:extLst>
-                <a:ext uri="{FF2B5EF4-FFF2-40B4-BE49-F238E27FC236}">
-                  <a16:creationId xmlns:a16="http://schemas.microsoft.com/office/drawing/2014/main" id="{7FD9F0B9-8B8B-4911-B4CC-2C9419DADD79}"/>
-                </a:ext>
-              </a:extLst>
-            </p:cNvPr>
-            <p:cNvSpPr txBox="1"/>
-            <p:nvPr/>
-          </p:nvSpPr>
-          <p:spPr>
-            <a:xfrm>
-              <a:off x="7059166" y="4404099"/>
-              <a:ext cx="1316736" cy="369332"/>
-            </a:xfrm>
-            <a:prstGeom prst="rect">
-              <a:avLst/>
-            </a:prstGeom>
-            <a:noFill/>
-          </p:spPr>
-          <p:txBody>
-            <a:bodyPr wrap="square" rtlCol="0">
-              <a:spAutoFit/>
-            </a:bodyPr>
-            <a:lstStyle/>
-            <a:p>
-              <a:r>
-                <a:rPr lang="en-US" dirty="0"/>
-                <a:t>Container 2</a:t>
-              </a:r>
-            </a:p>
-          </p:txBody>
-        </p:sp>
-      </p:grpSp>
-      <p:grpSp>
-        <p:nvGrpSpPr>
-          <p:cNvPr id="16" name="Group 15">
-            <a:extLst>
-              <a:ext uri="{FF2B5EF4-FFF2-40B4-BE49-F238E27FC236}">
-                <a16:creationId xmlns:a16="http://schemas.microsoft.com/office/drawing/2014/main" id="{4081376D-DD77-41AB-A825-6DA691EC3461}"/>
-              </a:ext>
-            </a:extLst>
-          </p:cNvPr>
-          <p:cNvGrpSpPr/>
-          <p:nvPr/>
-        </p:nvGrpSpPr>
-        <p:grpSpPr>
-          <a:xfrm>
-            <a:off x="326137" y="2465832"/>
-            <a:ext cx="2279902" cy="1036320"/>
-            <a:chOff x="6096000" y="3737111"/>
-            <a:chExt cx="2279902" cy="1036320"/>
-          </a:xfrm>
-        </p:grpSpPr>
-        <p:sp>
-          <p:nvSpPr>
-            <p:cNvPr id="11" name="Rectangle 10">
-              <a:extLst>
-                <a:ext uri="{FF2B5EF4-FFF2-40B4-BE49-F238E27FC236}">
-                  <a16:creationId xmlns:a16="http://schemas.microsoft.com/office/drawing/2014/main" id="{52979551-55E4-4E4D-8229-97BC71FBE5E7}"/>
-                </a:ext>
-              </a:extLst>
-            </p:cNvPr>
-            <p:cNvSpPr/>
-            <p:nvPr/>
-          </p:nvSpPr>
-          <p:spPr>
-            <a:xfrm>
-              <a:off x="6096000" y="3737111"/>
-              <a:ext cx="2173219" cy="1021080"/>
-            </a:xfrm>
-            <a:prstGeom prst="rect">
-              <a:avLst/>
-            </a:prstGeom>
-            <a:solidFill>
-              <a:schemeClr val="accent3">
-                <a:lumMod val="60000"/>
-                <a:lumOff val="40000"/>
-              </a:schemeClr>
-            </a:solidFill>
-          </p:spPr>
-          <p:style>
-            <a:lnRef idx="2">
-              <a:schemeClr val="accent1">
-                <a:shade val="50000"/>
-              </a:schemeClr>
-            </a:lnRef>
-            <a:fillRef idx="1">
-              <a:schemeClr val="accent1"/>
-            </a:fillRef>
-            <a:effectRef idx="0">
-              <a:schemeClr val="accent1"/>
-            </a:effectRef>
-            <a:fontRef idx="minor">
-              <a:schemeClr val="lt1"/>
-            </a:fontRef>
-          </p:style>
-          <p:txBody>
-            <a:bodyPr rtlCol="0" anchor="ctr"/>
-            <a:lstStyle/>
-            <a:p>
-              <a:pPr algn="ctr"/>
-              <a:endParaRPr lang="en-US" dirty="0"/>
-            </a:p>
-          </p:txBody>
-        </p:sp>
-        <p:sp>
-          <p:nvSpPr>
-            <p:cNvPr id="12" name="TextBox 11">
-              <a:extLst>
-                <a:ext uri="{FF2B5EF4-FFF2-40B4-BE49-F238E27FC236}">
-                  <a16:creationId xmlns:a16="http://schemas.microsoft.com/office/drawing/2014/main" id="{A6E0892C-304C-40B0-9A97-E6F72C1B58E1}"/>
-                </a:ext>
-              </a:extLst>
-            </p:cNvPr>
-            <p:cNvSpPr txBox="1"/>
-            <p:nvPr/>
-          </p:nvSpPr>
-          <p:spPr>
-            <a:xfrm>
-              <a:off x="7059166" y="4404099"/>
-              <a:ext cx="1316736" cy="369332"/>
-            </a:xfrm>
-            <a:prstGeom prst="rect">
-              <a:avLst/>
-            </a:prstGeom>
-            <a:noFill/>
-          </p:spPr>
-          <p:txBody>
-            <a:bodyPr wrap="square" rtlCol="0">
-              <a:spAutoFit/>
-            </a:bodyPr>
-            <a:lstStyle/>
-            <a:p>
-              <a:r>
-                <a:rPr lang="en-US" dirty="0"/>
-                <a:t>Container 1</a:t>
-              </a:r>
-            </a:p>
-          </p:txBody>
-        </p:sp>
-      </p:grpSp>
-      <p:sp>
-        <p:nvSpPr>
-          <p:cNvPr id="4" name="Rectangle 3">
-            <a:extLst>
-              <a:ext uri="{FF2B5EF4-FFF2-40B4-BE49-F238E27FC236}">
-                <a16:creationId xmlns:a16="http://schemas.microsoft.com/office/drawing/2014/main" id="{33C95CA7-F930-47A3-B153-678E4F03B53D}"/>
+      <p:sp>
+        <p:nvSpPr>
+          <p:cNvPr id="2" name="Rectangle 1">
+            <a:extLst>
+              <a:ext uri="{FF2B5EF4-FFF2-40B4-BE49-F238E27FC236}">
+                <a16:creationId xmlns:a16="http://schemas.microsoft.com/office/drawing/2014/main" id="{C5847BE1-88F7-404E-98FE-CEDF76A9158C}"/>
               </a:ext>
             </a:extLst>
           </p:cNvPr>
@@ -3659,17 +3341,21 @@
         </p:nvSpPr>
         <p:spPr>
           <a:xfrm>
-            <a:off x="4178808" y="776977"/>
-            <a:ext cx="1792224" cy="649224"/>
+            <a:off x="633984" y="2093976"/>
+            <a:ext cx="2996184" cy="1545336"/>
           </a:xfrm>
           <a:prstGeom prst="rect">
             <a:avLst/>
           </a:prstGeom>
           <a:solidFill>
-            <a:schemeClr val="accent6">
-              <a:lumMod val="75000"/>
+            <a:schemeClr val="accent1">
+              <a:lumMod val="40000"/>
+              <a:lumOff val="60000"/>
             </a:schemeClr>
           </a:solidFill>
+          <a:ln>
+            <a:noFill/>
+          </a:ln>
         </p:spPr>
         <p:style>
           <a:lnRef idx="2">
@@ -3692,19 +3378,16 @@
           <a:lstStyle/>
           <a:p>
             <a:pPr algn="ctr"/>
-            <a:r>
-              <a:rPr lang="en-US" dirty="0"/>
-              <a:t>IProvider</a:t>
-            </a:r>
-          </a:p>
-        </p:txBody>
-      </p:sp>
-      <p:sp>
-        <p:nvSpPr>
-          <p:cNvPr id="5" name="Rectangle 4">
-            <a:extLst>
-              <a:ext uri="{FF2B5EF4-FFF2-40B4-BE49-F238E27FC236}">
-                <a16:creationId xmlns:a16="http://schemas.microsoft.com/office/drawing/2014/main" id="{D873B155-2F93-4964-B493-84BBA72ED94E}"/>
+            <a:endParaRPr lang="en-US"/>
+          </a:p>
+        </p:txBody>
+      </p:sp>
+      <p:sp>
+        <p:nvSpPr>
+          <p:cNvPr id="3" name="Rectangle 2">
+            <a:extLst>
+              <a:ext uri="{FF2B5EF4-FFF2-40B4-BE49-F238E27FC236}">
+                <a16:creationId xmlns:a16="http://schemas.microsoft.com/office/drawing/2014/main" id="{5D5D7098-6EF1-4753-84AC-0AD9A8866B60}"/>
               </a:ext>
             </a:extLst>
           </p:cNvPr>
@@ -3713,12 +3396,21 @@
         </p:nvSpPr>
         <p:spPr>
           <a:xfrm>
-            <a:off x="4178808" y="2538721"/>
-            <a:ext cx="1792224" cy="649224"/>
+            <a:off x="728472" y="2212848"/>
+            <a:ext cx="2310384" cy="740664"/>
           </a:xfrm>
           <a:prstGeom prst="rect">
             <a:avLst/>
           </a:prstGeom>
+          <a:solidFill>
+            <a:schemeClr val="accent2">
+              <a:lumMod val="60000"/>
+              <a:lumOff val="40000"/>
+            </a:schemeClr>
+          </a:solidFill>
+          <a:ln>
+            <a:noFill/>
+          </a:ln>
         </p:spPr>
         <p:style>
           <a:lnRef idx="2">
@@ -3742,18 +3434,33 @@
           <a:p>
             <a:pPr algn="ctr"/>
             <a:r>
-              <a:rPr lang="en-US" dirty="0"/>
-              <a:t>Consumer</a:t>
-            </a:r>
-          </a:p>
-        </p:txBody>
-      </p:sp>
-      <p:sp>
-        <p:nvSpPr>
-          <p:cNvPr id="6" name="Rectangle 5">
-            <a:extLst>
-              <a:ext uri="{FF2B5EF4-FFF2-40B4-BE49-F238E27FC236}">
-                <a16:creationId xmlns:a16="http://schemas.microsoft.com/office/drawing/2014/main" id="{B220AD71-1B57-4353-B0B3-B255028E1003}"/>
+              <a:rPr lang="en-US" dirty="0">
+                <a:solidFill>
+                  <a:schemeClr val="tx1"/>
+                </a:solidFill>
+              </a:rPr>
+              <a:t>Docker Container</a:t>
+            </a:r>
+          </a:p>
+          <a:p>
+            <a:pPr algn="ctr"/>
+            <a:r>
+              <a:rPr lang="en-US" dirty="0">
+                <a:solidFill>
+                  <a:schemeClr val="tx1"/>
+                </a:solidFill>
+              </a:rPr>
+              <a:t>(CloudConsumer)</a:t>
+            </a:r>
+          </a:p>
+        </p:txBody>
+      </p:sp>
+      <p:sp>
+        <p:nvSpPr>
+          <p:cNvPr id="23" name="Rectangle 22">
+            <a:extLst>
+              <a:ext uri="{FF2B5EF4-FFF2-40B4-BE49-F238E27FC236}">
+                <a16:creationId xmlns:a16="http://schemas.microsoft.com/office/drawing/2014/main" id="{E3602102-7557-4D58-9F9C-98230F44DD17}"/>
               </a:ext>
             </a:extLst>
           </p:cNvPr>
@@ -3762,12 +3469,21 @@
         </p:nvSpPr>
         <p:spPr>
           <a:xfrm>
-            <a:off x="350520" y="2538721"/>
-            <a:ext cx="1792224" cy="649224"/>
+            <a:off x="728472" y="795265"/>
+            <a:ext cx="2310384" cy="649224"/>
           </a:xfrm>
           <a:prstGeom prst="rect">
             <a:avLst/>
           </a:prstGeom>
+          <a:solidFill>
+            <a:schemeClr val="accent6">
+              <a:lumMod val="60000"/>
+              <a:lumOff val="40000"/>
+            </a:schemeClr>
+          </a:solidFill>
+          <a:ln>
+            <a:noFill/>
+          </a:ln>
         </p:spPr>
         <p:style>
           <a:lnRef idx="2">
@@ -3791,18 +3507,138 @@
           <a:p>
             <a:pPr algn="ctr"/>
             <a:r>
+              <a:rPr lang="en-US" dirty="0">
+                <a:solidFill>
+                  <a:schemeClr val="tx1"/>
+                </a:solidFill>
+              </a:rPr>
+              <a:t>Refinitiv Real-Time</a:t>
+            </a:r>
+          </a:p>
+          <a:p>
+            <a:pPr algn="ctr"/>
+            <a:r>
+              <a:rPr lang="en-US" dirty="0">
+                <a:solidFill>
+                  <a:schemeClr val="tx1"/>
+                </a:solidFill>
+              </a:rPr>
+              <a:t>Optimized (AWS)</a:t>
+            </a:r>
+          </a:p>
+        </p:txBody>
+      </p:sp>
+      <p:sp>
+        <p:nvSpPr>
+          <p:cNvPr id="8" name="TextBox 7">
+            <a:extLst>
+              <a:ext uri="{FF2B5EF4-FFF2-40B4-BE49-F238E27FC236}">
+                <a16:creationId xmlns:a16="http://schemas.microsoft.com/office/drawing/2014/main" id="{B9180B4C-1642-485C-8EAB-867DA4EDDE70}"/>
+              </a:ext>
+            </a:extLst>
+          </p:cNvPr>
+          <p:cNvSpPr txBox="1"/>
+          <p:nvPr/>
+        </p:nvSpPr>
+        <p:spPr>
+          <a:xfrm>
+            <a:off x="2270760" y="3217902"/>
+            <a:ext cx="1536192" cy="369332"/>
+          </a:xfrm>
+          <a:prstGeom prst="rect">
+            <a:avLst/>
+          </a:prstGeom>
+          <a:noFill/>
+        </p:spPr>
+        <p:txBody>
+          <a:bodyPr wrap="square" rtlCol="0">
+            <a:spAutoFit/>
+          </a:bodyPr>
+          <a:lstStyle/>
+          <a:p>
+            <a:r>
               <a:rPr lang="en-US" dirty="0"/>
-              <a:t>CloudConsumer</a:t>
-            </a:r>
-          </a:p>
-        </p:txBody>
-      </p:sp>
-      <p:sp>
-        <p:nvSpPr>
-          <p:cNvPr id="7" name="Rectangle 6">
-            <a:extLst>
-              <a:ext uri="{FF2B5EF4-FFF2-40B4-BE49-F238E27FC236}">
-                <a16:creationId xmlns:a16="http://schemas.microsoft.com/office/drawing/2014/main" id="{52635CCD-7BD3-49BA-B320-0C0CF1826983}"/>
+              <a:t>Docker Host</a:t>
+            </a:r>
+          </a:p>
+        </p:txBody>
+      </p:sp>
+      <p:cxnSp>
+        <p:nvCxnSpPr>
+          <p:cNvPr id="14" name="Straight Connector 13">
+            <a:extLst>
+              <a:ext uri="{FF2B5EF4-FFF2-40B4-BE49-F238E27FC236}">
+                <a16:creationId xmlns:a16="http://schemas.microsoft.com/office/drawing/2014/main" id="{CFDCA9DA-BE3B-4D18-A81B-834105C8816A}"/>
+              </a:ext>
+            </a:extLst>
+          </p:cNvPr>
+          <p:cNvCxnSpPr>
+            <a:stCxn id="23" idx="2"/>
+            <a:endCxn id="3" idx="0"/>
+          </p:cNvCxnSpPr>
+          <p:nvPr/>
+        </p:nvCxnSpPr>
+        <p:spPr>
+          <a:xfrm>
+            <a:off x="1883664" y="1444489"/>
+            <a:ext cx="0" cy="768359"/>
+          </a:xfrm>
+          <a:prstGeom prst="line">
+            <a:avLst/>
+          </a:prstGeom>
+          <a:ln w="19050"/>
+        </p:spPr>
+        <p:style>
+          <a:lnRef idx="1">
+            <a:schemeClr val="accent1"/>
+          </a:lnRef>
+          <a:fillRef idx="0">
+            <a:schemeClr val="accent1"/>
+          </a:fillRef>
+          <a:effectRef idx="0">
+            <a:schemeClr val="accent1"/>
+          </a:effectRef>
+          <a:fontRef idx="minor">
+            <a:schemeClr val="tx1"/>
+          </a:fontRef>
+        </p:style>
+      </p:cxnSp>
+    </p:spTree>
+    <p:extLst>
+      <p:ext uri="{BB962C8B-B14F-4D97-AF65-F5344CB8AC3E}">
+        <p14:creationId xmlns:p14="http://schemas.microsoft.com/office/powerpoint/2010/main" val="2436993438"/>
+      </p:ext>
+    </p:extLst>
+  </p:cSld>
+  <p:clrMapOvr>
+    <a:masterClrMapping/>
+  </p:clrMapOvr>
+</p:sld>
+</file>
+
+<file path=ppt/slides/slide2.xml><?xml version="1.0" encoding="utf-8"?>
+<p:sld xmlns:a="http://schemas.openxmlformats.org/drawingml/2006/main" xmlns:r="http://schemas.openxmlformats.org/officeDocument/2006/relationships" xmlns:p="http://schemas.openxmlformats.org/presentationml/2006/main">
+  <p:cSld>
+    <p:spTree>
+      <p:nvGrpSpPr>
+        <p:cNvPr id="1" name=""/>
+        <p:cNvGrpSpPr/>
+        <p:nvPr/>
+      </p:nvGrpSpPr>
+      <p:grpSpPr>
+        <a:xfrm>
+          <a:off x="0" y="0"/>
+          <a:ext cx="0" cy="0"/>
+          <a:chOff x="0" y="0"/>
+          <a:chExt cx="0" cy="0"/>
+        </a:xfrm>
+      </p:grpSpPr>
+      <p:sp>
+        <p:nvSpPr>
+          <p:cNvPr id="2" name="Rectangle 1">
+            <a:extLst>
+              <a:ext uri="{FF2B5EF4-FFF2-40B4-BE49-F238E27FC236}">
+                <a16:creationId xmlns:a16="http://schemas.microsoft.com/office/drawing/2014/main" id="{C5847BE1-88F7-404E-98FE-CEDF76A9158C}"/>
               </a:ext>
             </a:extLst>
           </p:cNvPr>
@@ -3811,17 +3647,21 @@
         </p:nvSpPr>
         <p:spPr>
           <a:xfrm>
-            <a:off x="350520" y="776977"/>
-            <a:ext cx="1792224" cy="649224"/>
+            <a:off x="259080" y="420624"/>
+            <a:ext cx="7120128" cy="2532888"/>
           </a:xfrm>
           <a:prstGeom prst="rect">
             <a:avLst/>
           </a:prstGeom>
           <a:solidFill>
-            <a:schemeClr val="accent2">
-              <a:lumMod val="75000"/>
+            <a:schemeClr val="accent1">
+              <a:lumMod val="40000"/>
+              <a:lumOff val="60000"/>
             </a:schemeClr>
           </a:solidFill>
+          <a:ln>
+            <a:noFill/>
+          </a:ln>
         </p:spPr>
         <p:style>
           <a:lnRef idx="2">
@@ -3844,47 +3684,280 @@
           <a:lstStyle/>
           <a:p>
             <a:pPr algn="ctr"/>
-            <a:r>
-              <a:rPr lang="en-US" dirty="0"/>
-              <a:t>RRTO (AWS)</a:t>
-            </a:r>
+            <a:endParaRPr lang="en-US"/>
+          </a:p>
+        </p:txBody>
+      </p:sp>
+      <p:sp>
+        <p:nvSpPr>
+          <p:cNvPr id="3" name="Rectangle 2">
+            <a:extLst>
+              <a:ext uri="{FF2B5EF4-FFF2-40B4-BE49-F238E27FC236}">
+                <a16:creationId xmlns:a16="http://schemas.microsoft.com/office/drawing/2014/main" id="{5D5D7098-6EF1-4753-84AC-0AD9A8866B60}"/>
+              </a:ext>
+            </a:extLst>
+          </p:cNvPr>
+          <p:cNvSpPr/>
+          <p:nvPr/>
+        </p:nvSpPr>
+        <p:spPr>
+          <a:xfrm>
+            <a:off x="435864" y="630936"/>
+            <a:ext cx="2310384" cy="740664"/>
+          </a:xfrm>
+          <a:prstGeom prst="rect">
+            <a:avLst/>
+          </a:prstGeom>
+          <a:solidFill>
+            <a:schemeClr val="accent2">
+              <a:lumMod val="60000"/>
+              <a:lumOff val="40000"/>
+            </a:schemeClr>
+          </a:solidFill>
+          <a:ln>
+            <a:noFill/>
+          </a:ln>
+        </p:spPr>
+        <p:style>
+          <a:lnRef idx="2">
+            <a:schemeClr val="accent1">
+              <a:shade val="50000"/>
+            </a:schemeClr>
+          </a:lnRef>
+          <a:fillRef idx="1">
+            <a:schemeClr val="accent1"/>
+          </a:fillRef>
+          <a:effectRef idx="0">
+            <a:schemeClr val="accent1"/>
+          </a:effectRef>
+          <a:fontRef idx="minor">
+            <a:schemeClr val="lt1"/>
+          </a:fontRef>
+        </p:style>
+        <p:txBody>
+          <a:bodyPr rtlCol="0" anchor="ctr"/>
+          <a:lstStyle/>
+          <a:p>
+            <a:pPr algn="ctr"/>
+            <a:r>
+              <a:rPr lang="en-US" dirty="0">
+                <a:solidFill>
+                  <a:schemeClr val="tx1"/>
+                </a:solidFill>
+              </a:rPr>
+              <a:t>Docker Container</a:t>
+            </a:r>
+          </a:p>
+          <a:p>
+            <a:pPr algn="ctr"/>
+            <a:r>
+              <a:rPr lang="en-US" dirty="0">
+                <a:solidFill>
+                  <a:schemeClr val="tx1"/>
+                </a:solidFill>
+              </a:rPr>
+              <a:t>(IProvider)</a:t>
+            </a:r>
+          </a:p>
+        </p:txBody>
+      </p:sp>
+      <p:sp>
+        <p:nvSpPr>
+          <p:cNvPr id="8" name="TextBox 7">
+            <a:extLst>
+              <a:ext uri="{FF2B5EF4-FFF2-40B4-BE49-F238E27FC236}">
+                <a16:creationId xmlns:a16="http://schemas.microsoft.com/office/drawing/2014/main" id="{B9180B4C-1642-485C-8EAB-867DA4EDDE70}"/>
+              </a:ext>
+            </a:extLst>
+          </p:cNvPr>
+          <p:cNvSpPr txBox="1"/>
+          <p:nvPr/>
+        </p:nvSpPr>
+        <p:spPr>
+          <a:xfrm>
+            <a:off x="5864352" y="2553402"/>
+            <a:ext cx="2200656" cy="400110"/>
+          </a:xfrm>
+          <a:prstGeom prst="rect">
+            <a:avLst/>
+          </a:prstGeom>
+          <a:noFill/>
+        </p:spPr>
+        <p:txBody>
+          <a:bodyPr wrap="square" rtlCol="0">
+            <a:spAutoFit/>
+          </a:bodyPr>
+          <a:lstStyle/>
+          <a:p>
+            <a:r>
+              <a:rPr lang="en-US" sz="2000" dirty="0"/>
+              <a:t>Docker Host</a:t>
+            </a:r>
+          </a:p>
+        </p:txBody>
+      </p:sp>
+      <p:sp>
+        <p:nvSpPr>
+          <p:cNvPr id="7" name="Rectangle 6">
+            <a:extLst>
+              <a:ext uri="{FF2B5EF4-FFF2-40B4-BE49-F238E27FC236}">
+                <a16:creationId xmlns:a16="http://schemas.microsoft.com/office/drawing/2014/main" id="{FF2AA0BD-972B-4E92-A160-FAC50A610D23}"/>
+              </a:ext>
+            </a:extLst>
+          </p:cNvPr>
+          <p:cNvSpPr/>
+          <p:nvPr/>
+        </p:nvSpPr>
+        <p:spPr>
+          <a:xfrm>
+            <a:off x="4236720" y="630936"/>
+            <a:ext cx="2310384" cy="740664"/>
+          </a:xfrm>
+          <a:prstGeom prst="rect">
+            <a:avLst/>
+          </a:prstGeom>
+          <a:solidFill>
+            <a:schemeClr val="accent2">
+              <a:lumMod val="60000"/>
+              <a:lumOff val="40000"/>
+            </a:schemeClr>
+          </a:solidFill>
+          <a:ln>
+            <a:noFill/>
+          </a:ln>
+        </p:spPr>
+        <p:style>
+          <a:lnRef idx="2">
+            <a:schemeClr val="accent1">
+              <a:shade val="50000"/>
+            </a:schemeClr>
+          </a:lnRef>
+          <a:fillRef idx="1">
+            <a:schemeClr val="accent1"/>
+          </a:fillRef>
+          <a:effectRef idx="0">
+            <a:schemeClr val="accent1"/>
+          </a:effectRef>
+          <a:fontRef idx="minor">
+            <a:schemeClr val="lt1"/>
+          </a:fontRef>
+        </p:style>
+        <p:txBody>
+          <a:bodyPr rtlCol="0" anchor="ctr"/>
+          <a:lstStyle/>
+          <a:p>
+            <a:pPr algn="ctr"/>
+            <a:r>
+              <a:rPr lang="en-US" dirty="0">
+                <a:solidFill>
+                  <a:schemeClr val="tx1"/>
+                </a:solidFill>
+              </a:rPr>
+              <a:t>Docker Container</a:t>
+            </a:r>
+          </a:p>
+          <a:p>
+            <a:pPr algn="ctr"/>
+            <a:r>
+              <a:rPr lang="en-US" dirty="0">
+                <a:solidFill>
+                  <a:schemeClr val="tx1"/>
+                </a:solidFill>
+              </a:rPr>
+              <a:t>(Consumer)</a:t>
+            </a:r>
+          </a:p>
+        </p:txBody>
+      </p:sp>
+      <p:sp>
+        <p:nvSpPr>
+          <p:cNvPr id="4" name="Rectangle 3">
+            <a:extLst>
+              <a:ext uri="{FF2B5EF4-FFF2-40B4-BE49-F238E27FC236}">
+                <a16:creationId xmlns:a16="http://schemas.microsoft.com/office/drawing/2014/main" id="{99FE0E9B-0F17-4EEA-AB14-CF279A1D68D8}"/>
+              </a:ext>
+            </a:extLst>
+          </p:cNvPr>
+          <p:cNvSpPr/>
+          <p:nvPr/>
+        </p:nvSpPr>
+        <p:spPr>
+          <a:xfrm>
+            <a:off x="708660" y="1943100"/>
+            <a:ext cx="5737860" cy="196597"/>
+          </a:xfrm>
+          <a:prstGeom prst="rect">
+            <a:avLst/>
+          </a:prstGeom>
+          <a:ln w="19050">
+            <a:solidFill>
+              <a:schemeClr val="tx1"/>
+            </a:solidFill>
+          </a:ln>
+        </p:spPr>
+        <p:style>
+          <a:lnRef idx="2">
+            <a:schemeClr val="accent1">
+              <a:shade val="50000"/>
+            </a:schemeClr>
+          </a:lnRef>
+          <a:fillRef idx="1">
+            <a:schemeClr val="accent1"/>
+          </a:fillRef>
+          <a:effectRef idx="0">
+            <a:schemeClr val="accent1"/>
+          </a:effectRef>
+          <a:fontRef idx="minor">
+            <a:schemeClr val="lt1"/>
+          </a:fontRef>
+        </p:style>
+        <p:txBody>
+          <a:bodyPr rtlCol="0" anchor="ctr"/>
+          <a:lstStyle/>
+          <a:p>
+            <a:pPr algn="ctr"/>
+            <a:endParaRPr lang="en-US"/>
           </a:p>
         </p:txBody>
       </p:sp>
       <p:cxnSp>
         <p:nvCxnSpPr>
-          <p:cNvPr id="9" name="Straight Connector 8">
-            <a:extLst>
-              <a:ext uri="{FF2B5EF4-FFF2-40B4-BE49-F238E27FC236}">
-                <a16:creationId xmlns:a16="http://schemas.microsoft.com/office/drawing/2014/main" id="{DDCB9D80-993E-460D-8367-2957F9B46744}"/>
+          <p:cNvPr id="6" name="Straight Connector 5">
+            <a:extLst>
+              <a:ext uri="{FF2B5EF4-FFF2-40B4-BE49-F238E27FC236}">
+                <a16:creationId xmlns:a16="http://schemas.microsoft.com/office/drawing/2014/main" id="{D27D69CC-0A65-4F16-A3BD-8F22F20D3C60}"/>
               </a:ext>
             </a:extLst>
           </p:cNvPr>
           <p:cNvCxnSpPr>
-            <a:stCxn id="4" idx="2"/>
-            <a:endCxn id="5" idx="0"/>
+            <a:cxnSpLocks/>
+            <a:stCxn id="3" idx="2"/>
           </p:cNvCxnSpPr>
           <p:nvPr/>
         </p:nvCxnSpPr>
         <p:spPr>
           <a:xfrm>
-            <a:off x="5074920" y="1426201"/>
-            <a:ext cx="0" cy="1112520"/>
+            <a:off x="1591056" y="1371600"/>
+            <a:ext cx="0" cy="571500"/>
           </a:xfrm>
           <a:prstGeom prst="line">
             <a:avLst/>
           </a:prstGeom>
-          <a:ln w="28575"/>
+          <a:ln w="19050">
+            <a:solidFill>
+              <a:schemeClr val="tx1"/>
+            </a:solidFill>
+          </a:ln>
         </p:spPr>
         <p:style>
           <a:lnRef idx="1">
-            <a:schemeClr val="dk1"/>
+            <a:schemeClr val="accent1"/>
           </a:lnRef>
           <a:fillRef idx="0">
-            <a:schemeClr val="dk1"/>
+            <a:schemeClr val="accent1"/>
           </a:fillRef>
           <a:effectRef idx="0">
-            <a:schemeClr val="dk1"/>
+            <a:schemeClr val="accent1"/>
           </a:effectRef>
           <a:fontRef idx="minor">
             <a:schemeClr val="tx1"/>
@@ -3893,35 +3966,41 @@
       </p:cxnSp>
       <p:cxnSp>
         <p:nvCxnSpPr>
-          <p:cNvPr id="10" name="Straight Connector 9">
-            <a:extLst>
-              <a:ext uri="{FF2B5EF4-FFF2-40B4-BE49-F238E27FC236}">
-                <a16:creationId xmlns:a16="http://schemas.microsoft.com/office/drawing/2014/main" id="{7752BF38-6BA3-48AE-8191-D8ABEEB35522}"/>
-              </a:ext>
-            </a:extLst>
-          </p:cNvPr>
-          <p:cNvCxnSpPr/>
+          <p:cNvPr id="12" name="Straight Connector 11">
+            <a:extLst>
+              <a:ext uri="{FF2B5EF4-FFF2-40B4-BE49-F238E27FC236}">
+                <a16:creationId xmlns:a16="http://schemas.microsoft.com/office/drawing/2014/main" id="{E0EDB51B-C00E-488B-AC4C-FD11A6731C7C}"/>
+              </a:ext>
+            </a:extLst>
+          </p:cNvPr>
+          <p:cNvCxnSpPr>
+            <a:cxnSpLocks/>
+          </p:cNvCxnSpPr>
           <p:nvPr/>
         </p:nvCxnSpPr>
         <p:spPr>
           <a:xfrm>
-            <a:off x="1246632" y="1426201"/>
-            <a:ext cx="0" cy="1112520"/>
+            <a:off x="5327904" y="1371600"/>
+            <a:ext cx="0" cy="571500"/>
           </a:xfrm>
           <a:prstGeom prst="line">
             <a:avLst/>
           </a:prstGeom>
-          <a:ln w="28575"/>
+          <a:ln w="19050">
+            <a:solidFill>
+              <a:schemeClr val="tx1"/>
+            </a:solidFill>
+          </a:ln>
         </p:spPr>
         <p:style>
           <a:lnRef idx="1">
-            <a:schemeClr val="dk1"/>
+            <a:schemeClr val="accent1"/>
           </a:lnRef>
           <a:fillRef idx="0">
-            <a:schemeClr val="dk1"/>
+            <a:schemeClr val="accent1"/>
           </a:fillRef>
           <a:effectRef idx="0">
-            <a:schemeClr val="dk1"/>
+            <a:schemeClr val="accent1"/>
           </a:effectRef>
           <a:fontRef idx="minor">
             <a:schemeClr val="tx1"/>
@@ -3930,10 +4009,10 @@
       </p:cxnSp>
       <p:sp>
         <p:nvSpPr>
-          <p:cNvPr id="24" name="TextBox 23">
-            <a:extLst>
-              <a:ext uri="{FF2B5EF4-FFF2-40B4-BE49-F238E27FC236}">
-                <a16:creationId xmlns:a16="http://schemas.microsoft.com/office/drawing/2014/main" id="{A766267A-D56B-40B6-9245-A89B54BFC9FF}"/>
+          <p:cNvPr id="13" name="TextBox 12">
+            <a:extLst>
+              <a:ext uri="{FF2B5EF4-FFF2-40B4-BE49-F238E27FC236}">
+                <a16:creationId xmlns:a16="http://schemas.microsoft.com/office/drawing/2014/main" id="{FE8F58CF-D87B-4AA3-817A-07145A3A4E99}"/>
               </a:ext>
             </a:extLst>
           </p:cNvPr>
@@ -3942,8 +4021,8 @@
         </p:nvSpPr>
         <p:spPr>
           <a:xfrm>
-            <a:off x="484632" y="192024"/>
-            <a:ext cx="1481328" cy="369332"/>
+            <a:off x="2746248" y="2146494"/>
+            <a:ext cx="2200656" cy="338554"/>
           </a:xfrm>
           <a:prstGeom prst="rect">
             <a:avLst/>
@@ -3957,43 +4036,112 @@
           <a:lstStyle/>
           <a:p>
             <a:r>
-              <a:rPr lang="en-US" dirty="0"/>
-              <a:t>Use Case 1</a:t>
-            </a:r>
-          </a:p>
-        </p:txBody>
-      </p:sp>
-      <p:sp>
-        <p:nvSpPr>
-          <p:cNvPr id="25" name="TextBox 24">
-            <a:extLst>
-              <a:ext uri="{FF2B5EF4-FFF2-40B4-BE49-F238E27FC236}">
-                <a16:creationId xmlns:a16="http://schemas.microsoft.com/office/drawing/2014/main" id="{4DFA0319-BFBB-41A3-8837-B8C3B7DC54F3}"/>
-              </a:ext>
-            </a:extLst>
-          </p:cNvPr>
-          <p:cNvSpPr txBox="1"/>
+              <a:rPr lang="en-US" sz="1600" dirty="0">
+                <a:solidFill>
+                  <a:schemeClr val="tx2">
+                    <a:lumMod val="75000"/>
+                  </a:schemeClr>
+                </a:solidFill>
+              </a:rPr>
+              <a:t>Docker Network</a:t>
+            </a:r>
+          </a:p>
+        </p:txBody>
+      </p:sp>
+      <p:cxnSp>
+        <p:nvCxnSpPr>
+          <p:cNvPr id="11" name="Straight Arrow Connector 10">
+            <a:extLst>
+              <a:ext uri="{FF2B5EF4-FFF2-40B4-BE49-F238E27FC236}">
+                <a16:creationId xmlns:a16="http://schemas.microsoft.com/office/drawing/2014/main" id="{38E7E4B2-9527-4C5F-9E7F-F380F3D3D4A5}"/>
+              </a:ext>
+            </a:extLst>
+          </p:cNvPr>
+          <p:cNvCxnSpPr/>
+          <p:nvPr/>
+        </p:nvCxnSpPr>
+        <p:spPr>
+          <a:xfrm flipH="1">
+            <a:off x="2746248" y="1001268"/>
+            <a:ext cx="1490472" cy="0"/>
+          </a:xfrm>
+          <a:prstGeom prst="straightConnector1">
+            <a:avLst/>
+          </a:prstGeom>
+          <a:ln w="19050">
+            <a:tailEnd type="arrow" w="lg" len="med"/>
+          </a:ln>
+        </p:spPr>
+        <p:style>
+          <a:lnRef idx="1">
+            <a:schemeClr val="accent1"/>
+          </a:lnRef>
+          <a:fillRef idx="0">
+            <a:schemeClr val="accent1"/>
+          </a:fillRef>
+          <a:effectRef idx="0">
+            <a:schemeClr val="accent1"/>
+          </a:effectRef>
+          <a:fontRef idx="minor">
+            <a:schemeClr val="tx1"/>
+          </a:fontRef>
+        </p:style>
+      </p:cxnSp>
+      <p:sp>
+        <p:nvSpPr>
+          <p:cNvPr id="15" name="Rectangle 14">
+            <a:extLst>
+              <a:ext uri="{FF2B5EF4-FFF2-40B4-BE49-F238E27FC236}">
+                <a16:creationId xmlns:a16="http://schemas.microsoft.com/office/drawing/2014/main" id="{A4BFA742-715B-4852-B9DA-76C83DC049FE}"/>
+              </a:ext>
+            </a:extLst>
+          </p:cNvPr>
+          <p:cNvSpPr/>
           <p:nvPr/>
         </p:nvSpPr>
         <p:spPr>
           <a:xfrm>
-            <a:off x="4346448" y="215949"/>
-            <a:ext cx="1481328" cy="369332"/>
+            <a:off x="3052572" y="902969"/>
+            <a:ext cx="877824" cy="196597"/>
           </a:xfrm>
           <a:prstGeom prst="rect">
             <a:avLst/>
           </a:prstGeom>
-          <a:noFill/>
+          <a:solidFill>
+            <a:schemeClr val="bg1"/>
+          </a:solidFill>
+          <a:ln>
+            <a:noFill/>
+          </a:ln>
         </p:spPr>
-        <p:txBody>
-          <a:bodyPr wrap="square" rtlCol="0">
-            <a:spAutoFit/>
-          </a:bodyPr>
-          <a:lstStyle/>
-          <a:p>
-            <a:r>
-              <a:rPr lang="en-US" dirty="0"/>
-              <a:t>Use Case 2</a:t>
+        <p:style>
+          <a:lnRef idx="2">
+            <a:schemeClr val="accent1">
+              <a:shade val="50000"/>
+            </a:schemeClr>
+          </a:lnRef>
+          <a:fillRef idx="1">
+            <a:schemeClr val="accent1"/>
+          </a:fillRef>
+          <a:effectRef idx="0">
+            <a:schemeClr val="accent1"/>
+          </a:effectRef>
+          <a:fontRef idx="minor">
+            <a:schemeClr val="lt1"/>
+          </a:fontRef>
+        </p:style>
+        <p:txBody>
+          <a:bodyPr rtlCol="0" anchor="ctr"/>
+          <a:lstStyle/>
+          <a:p>
+            <a:pPr algn="ctr"/>
+            <a:r>
+              <a:rPr lang="en-US" sz="1400" dirty="0">
+                <a:solidFill>
+                  <a:schemeClr val="tx1"/>
+                </a:solidFill>
+              </a:rPr>
+              <a:t>provider</a:t>
             </a:r>
           </a:p>
         </p:txBody>
@@ -4001,7 +4149,7 @@
     </p:spTree>
     <p:extLst>
       <p:ext uri="{BB962C8B-B14F-4D97-AF65-F5344CB8AC3E}">
-        <p14:creationId xmlns:p14="http://schemas.microsoft.com/office/powerpoint/2010/main" val="3913456957"/>
+        <p14:creationId xmlns:p14="http://schemas.microsoft.com/office/powerpoint/2010/main" val="1479204690"/>
       </p:ext>
     </p:extLst>
   </p:cSld>

</xml_diff>

<commit_message>
Update simpleCloudConsumer to support Java 17 and RTSDK version 3.9.0.1
- Updated pom.xml to set Java compiler source and target to 17 and updated RTSDK version to 3.9.0.1.
- Removed obsolete run.sh script.
- Refactored CloudConsumer.java to remove username and password parameters, replacing them with clientSecret. Updated command line argument parsing accordingly.
- Changed default location from "us-east" to "ap-southeast".
- Removed WebSocket related code and parameters.
- Updated Dockerfiles for Consumer and IProvider to use Java 17 and streamline the build process.
- Updated log4j-slfj4 binding configurations
</commit_message>
<xml_diff>
--- a/diagram.pptx
+++ b/diagram.pptx
@@ -260,7 +260,7 @@
           <a:p>
             <a:fld id="{8A917354-6903-4EC6-B90E-505176212F8F}" type="datetimeFigureOut">
               <a:rPr lang="en-US" smtClean="0"/>
-              <a:t>4/21/2021</a:t>
+              <a:t>6/24/2025</a:t>
             </a:fld>
             <a:endParaRPr lang="en-US"/>
           </a:p>
@@ -458,7 +458,7 @@
           <a:p>
             <a:fld id="{8A917354-6903-4EC6-B90E-505176212F8F}" type="datetimeFigureOut">
               <a:rPr lang="en-US" smtClean="0"/>
-              <a:t>4/21/2021</a:t>
+              <a:t>6/24/2025</a:t>
             </a:fld>
             <a:endParaRPr lang="en-US"/>
           </a:p>
@@ -666,7 +666,7 @@
           <a:p>
             <a:fld id="{8A917354-6903-4EC6-B90E-505176212F8F}" type="datetimeFigureOut">
               <a:rPr lang="en-US" smtClean="0"/>
-              <a:t>4/21/2021</a:t>
+              <a:t>6/24/2025</a:t>
             </a:fld>
             <a:endParaRPr lang="en-US"/>
           </a:p>
@@ -864,7 +864,7 @@
           <a:p>
             <a:fld id="{8A917354-6903-4EC6-B90E-505176212F8F}" type="datetimeFigureOut">
               <a:rPr lang="en-US" smtClean="0"/>
-              <a:t>4/21/2021</a:t>
+              <a:t>6/24/2025</a:t>
             </a:fld>
             <a:endParaRPr lang="en-US"/>
           </a:p>
@@ -1139,7 +1139,7 @@
           <a:p>
             <a:fld id="{8A917354-6903-4EC6-B90E-505176212F8F}" type="datetimeFigureOut">
               <a:rPr lang="en-US" smtClean="0"/>
-              <a:t>4/21/2021</a:t>
+              <a:t>6/24/2025</a:t>
             </a:fld>
             <a:endParaRPr lang="en-US"/>
           </a:p>
@@ -1404,7 +1404,7 @@
           <a:p>
             <a:fld id="{8A917354-6903-4EC6-B90E-505176212F8F}" type="datetimeFigureOut">
               <a:rPr lang="en-US" smtClean="0"/>
-              <a:t>4/21/2021</a:t>
+              <a:t>6/24/2025</a:t>
             </a:fld>
             <a:endParaRPr lang="en-US"/>
           </a:p>
@@ -1816,7 +1816,7 @@
           <a:p>
             <a:fld id="{8A917354-6903-4EC6-B90E-505176212F8F}" type="datetimeFigureOut">
               <a:rPr lang="en-US" smtClean="0"/>
-              <a:t>4/21/2021</a:t>
+              <a:t>6/24/2025</a:t>
             </a:fld>
             <a:endParaRPr lang="en-US"/>
           </a:p>
@@ -1957,7 +1957,7 @@
           <a:p>
             <a:fld id="{8A917354-6903-4EC6-B90E-505176212F8F}" type="datetimeFigureOut">
               <a:rPr lang="en-US" smtClean="0"/>
-              <a:t>4/21/2021</a:t>
+              <a:t>6/24/2025</a:t>
             </a:fld>
             <a:endParaRPr lang="en-US"/>
           </a:p>
@@ -2070,7 +2070,7 @@
           <a:p>
             <a:fld id="{8A917354-6903-4EC6-B90E-505176212F8F}" type="datetimeFigureOut">
               <a:rPr lang="en-US" smtClean="0"/>
-              <a:t>4/21/2021</a:t>
+              <a:t>6/24/2025</a:t>
             </a:fld>
             <a:endParaRPr lang="en-US"/>
           </a:p>
@@ -2381,7 +2381,7 @@
           <a:p>
             <a:fld id="{8A917354-6903-4EC6-B90E-505176212F8F}" type="datetimeFigureOut">
               <a:rPr lang="en-US" smtClean="0"/>
-              <a:t>4/21/2021</a:t>
+              <a:t>6/24/2025</a:t>
             </a:fld>
             <a:endParaRPr lang="en-US"/>
           </a:p>
@@ -2669,7 +2669,7 @@
           <a:p>
             <a:fld id="{8A917354-6903-4EC6-B90E-505176212F8F}" type="datetimeFigureOut">
               <a:rPr lang="en-US" smtClean="0"/>
-              <a:t>4/21/2021</a:t>
+              <a:t>6/24/2025</a:t>
             </a:fld>
             <a:endParaRPr lang="en-US"/>
           </a:p>
@@ -2910,7 +2910,7 @@
           <a:p>
             <a:fld id="{8A917354-6903-4EC6-B90E-505176212F8F}" type="datetimeFigureOut">
               <a:rPr lang="en-US" smtClean="0"/>
-              <a:t>4/21/2021</a:t>
+              <a:t>6/24/2025</a:t>
             </a:fld>
             <a:endParaRPr lang="en-US"/>
           </a:p>
@@ -3512,7 +3512,7 @@
                   <a:schemeClr val="tx1"/>
                 </a:solidFill>
               </a:rPr>
-              <a:t>Refinitiv Real-Time</a:t>
+              <a:t>Real-Time</a:t>
             </a:r>
           </a:p>
           <a:p>
@@ -3523,7 +3523,7 @@
                   <a:schemeClr val="tx1"/>
                 </a:solidFill>
               </a:rPr>
-              <a:t>Optimized (AWS)</a:t>
+              <a:t>Optimized (RTO)</a:t>
             </a:r>
           </a:p>
         </p:txBody>

</xml_diff>